<commit_message>
Uploaded report 6, updated report 7
</commit_message>
<xml_diff>
--- a/reports/07_general_types/general_types.pptx
+++ b/reports/07_general_types/general_types.pptx
@@ -16,8 +16,14 @@
     <p:sldId id="287" r:id="rId10"/>
     <p:sldId id="286" r:id="rId11"/>
     <p:sldId id="288" r:id="rId12"/>
-    <p:sldId id="261" r:id="rId13"/>
-    <p:sldId id="262" r:id="rId14"/>
+    <p:sldId id="257" r:id="rId13"/>
+    <p:sldId id="258" r:id="rId14"/>
+    <p:sldId id="259" r:id="rId15"/>
+    <p:sldId id="260" r:id="rId16"/>
+    <p:sldId id="289" r:id="rId17"/>
+    <p:sldId id="290" r:id="rId18"/>
+    <p:sldId id="261" r:id="rId19"/>
+    <p:sldId id="262" r:id="rId20"/>
   </p:sldIdLst>
   <p:sldSz cx="12192000" cy="6858000"/>
   <p:notesSz cx="6858000" cy="9144000"/>
@@ -271,7 +277,7 @@
           <a:p>
             <a:fld id="{64F5C602-8F22-4B35-A779-10F9AFEE1296}" type="datetimeFigureOut">
               <a:rPr lang="ru-RU" smtClean="0"/>
-              <a:t>05.11.2023</a:t>
+              <a:t>07.11.2023</a:t>
             </a:fld>
             <a:endParaRPr lang="ru-RU"/>
           </a:p>
@@ -469,7 +475,7 @@
           <a:p>
             <a:fld id="{64F5C602-8F22-4B35-A779-10F9AFEE1296}" type="datetimeFigureOut">
               <a:rPr lang="ru-RU" smtClean="0"/>
-              <a:t>05.11.2023</a:t>
+              <a:t>07.11.2023</a:t>
             </a:fld>
             <a:endParaRPr lang="ru-RU"/>
           </a:p>
@@ -677,7 +683,7 @@
           <a:p>
             <a:fld id="{64F5C602-8F22-4B35-A779-10F9AFEE1296}" type="datetimeFigureOut">
               <a:rPr lang="ru-RU" smtClean="0"/>
-              <a:t>05.11.2023</a:t>
+              <a:t>07.11.2023</a:t>
             </a:fld>
             <a:endParaRPr lang="ru-RU"/>
           </a:p>
@@ -875,7 +881,7 @@
           <a:p>
             <a:fld id="{64F5C602-8F22-4B35-A779-10F9AFEE1296}" type="datetimeFigureOut">
               <a:rPr lang="ru-RU" smtClean="0"/>
-              <a:t>05.11.2023</a:t>
+              <a:t>07.11.2023</a:t>
             </a:fld>
             <a:endParaRPr lang="ru-RU"/>
           </a:p>
@@ -1150,7 +1156,7 @@
           <a:p>
             <a:fld id="{64F5C602-8F22-4B35-A779-10F9AFEE1296}" type="datetimeFigureOut">
               <a:rPr lang="ru-RU" smtClean="0"/>
-              <a:t>05.11.2023</a:t>
+              <a:t>07.11.2023</a:t>
             </a:fld>
             <a:endParaRPr lang="ru-RU"/>
           </a:p>
@@ -1415,7 +1421,7 @@
           <a:p>
             <a:fld id="{64F5C602-8F22-4B35-A779-10F9AFEE1296}" type="datetimeFigureOut">
               <a:rPr lang="ru-RU" smtClean="0"/>
-              <a:t>05.11.2023</a:t>
+              <a:t>07.11.2023</a:t>
             </a:fld>
             <a:endParaRPr lang="ru-RU"/>
           </a:p>
@@ -1827,7 +1833,7 @@
           <a:p>
             <a:fld id="{64F5C602-8F22-4B35-A779-10F9AFEE1296}" type="datetimeFigureOut">
               <a:rPr lang="ru-RU" smtClean="0"/>
-              <a:t>05.11.2023</a:t>
+              <a:t>07.11.2023</a:t>
             </a:fld>
             <a:endParaRPr lang="ru-RU"/>
           </a:p>
@@ -1968,7 +1974,7 @@
           <a:p>
             <a:fld id="{64F5C602-8F22-4B35-A779-10F9AFEE1296}" type="datetimeFigureOut">
               <a:rPr lang="ru-RU" smtClean="0"/>
-              <a:t>05.11.2023</a:t>
+              <a:t>07.11.2023</a:t>
             </a:fld>
             <a:endParaRPr lang="ru-RU"/>
           </a:p>
@@ -2081,7 +2087,7 @@
           <a:p>
             <a:fld id="{64F5C602-8F22-4B35-A779-10F9AFEE1296}" type="datetimeFigureOut">
               <a:rPr lang="ru-RU" smtClean="0"/>
-              <a:t>05.11.2023</a:t>
+              <a:t>07.11.2023</a:t>
             </a:fld>
             <a:endParaRPr lang="ru-RU"/>
           </a:p>
@@ -2392,7 +2398,7 @@
           <a:p>
             <a:fld id="{64F5C602-8F22-4B35-A779-10F9AFEE1296}" type="datetimeFigureOut">
               <a:rPr lang="ru-RU" smtClean="0"/>
-              <a:t>05.11.2023</a:t>
+              <a:t>07.11.2023</a:t>
             </a:fld>
             <a:endParaRPr lang="ru-RU"/>
           </a:p>
@@ -2680,7 +2686,7 @@
           <a:p>
             <a:fld id="{64F5C602-8F22-4B35-A779-10F9AFEE1296}" type="datetimeFigureOut">
               <a:rPr lang="ru-RU" smtClean="0"/>
-              <a:t>05.11.2023</a:t>
+              <a:t>07.11.2023</a:t>
             </a:fld>
             <a:endParaRPr lang="ru-RU"/>
           </a:p>
@@ -2921,7 +2927,7 @@
           <a:p>
             <a:fld id="{64F5C602-8F22-4B35-A779-10F9AFEE1296}" type="datetimeFigureOut">
               <a:rPr lang="ru-RU" smtClean="0"/>
-              <a:t>05.11.2023</a:t>
+              <a:t>07.11.2023</a:t>
             </a:fld>
             <a:endParaRPr lang="ru-RU"/>
           </a:p>
@@ -3634,8 +3640,8 @@
         </p:nvSpPr>
         <p:spPr>
           <a:xfrm>
-            <a:off x="6721642" y="1690688"/>
-            <a:ext cx="5149516" cy="2585323"/>
+            <a:off x="6382139" y="1483993"/>
+            <a:ext cx="5570375" cy="2585323"/>
           </a:xfrm>
           <a:prstGeom prst="rect">
             <a:avLst/>
@@ -3742,6 +3748,1120 @@
           <p:cNvPr id="2" name="Заголовок 1">
             <a:extLst>
               <a:ext uri="{FF2B5EF4-FFF2-40B4-BE49-F238E27FC236}">
+                <a16:creationId xmlns:a16="http://schemas.microsoft.com/office/drawing/2014/main" id="{F3830B5C-1DAB-33F8-D4D7-16F926B4A5E4}"/>
+              </a:ext>
+            </a:extLst>
+          </p:cNvPr>
+          <p:cNvSpPr>
+            <a:spLocks noGrp="1"/>
+          </p:cNvSpPr>
+          <p:nvPr>
+            <p:ph type="title"/>
+          </p:nvPr>
+        </p:nvSpPr>
+        <p:spPr/>
+        <p:txBody>
+          <a:bodyPr/>
+          <a:lstStyle/>
+          <a:p>
+            <a:r>
+              <a:rPr lang="ru-RU" i="0" dirty="0">
+                <a:solidFill>
+                  <a:srgbClr val="000000"/>
+                </a:solidFill>
+                <a:effectLst/>
+                <a:latin typeface="Open Sans" panose="020B0606030504020204" pitchFamily="34" charset="0"/>
+              </a:rPr>
+              <a:t>Типажи как параметры (1/4)</a:t>
+            </a:r>
+            <a:br>
+              <a:rPr lang="ru-RU" i="0" dirty="0">
+                <a:solidFill>
+                  <a:srgbClr val="000000"/>
+                </a:solidFill>
+                <a:effectLst/>
+                <a:latin typeface="Open Sans" panose="020B0606030504020204" pitchFamily="34" charset="0"/>
+              </a:rPr>
+            </a:br>
+            <a:endParaRPr lang="ru-RU" dirty="0"/>
+          </a:p>
+        </p:txBody>
+      </p:sp>
+      <p:sp>
+        <p:nvSpPr>
+          <p:cNvPr id="3" name="Объект 2">
+            <a:extLst>
+              <a:ext uri="{FF2B5EF4-FFF2-40B4-BE49-F238E27FC236}">
+                <a16:creationId xmlns:a16="http://schemas.microsoft.com/office/drawing/2014/main" id="{3E29F3DD-B0D1-156C-10A7-55658CCD8C39}"/>
+              </a:ext>
+            </a:extLst>
+          </p:cNvPr>
+          <p:cNvSpPr>
+            <a:spLocks noGrp="1"/>
+          </p:cNvSpPr>
+          <p:nvPr>
+            <p:ph idx="1"/>
+          </p:nvPr>
+        </p:nvSpPr>
+        <p:spPr/>
+        <p:txBody>
+          <a:bodyPr/>
+          <a:lstStyle/>
+          <a:p>
+            <a:r>
+              <a:rPr lang="ru-RU" dirty="0"/>
+              <a:t>Вместо передачи конкретного типа можно передавать </a:t>
+            </a:r>
+            <a:r>
+              <a:rPr lang="en-AU" dirty="0"/>
+              <a:t>trait</a:t>
+            </a:r>
+          </a:p>
+          <a:p>
+            <a:r>
+              <a:rPr lang="ru-RU" dirty="0"/>
+              <a:t>Для этого необходимо указать </a:t>
+            </a:r>
+            <a:r>
+              <a:rPr lang="en-AU" dirty="0"/>
+              <a:t>“</a:t>
+            </a:r>
+            <a:r>
+              <a:rPr lang="en-AU" dirty="0" err="1"/>
+              <a:t>impl</a:t>
+            </a:r>
+            <a:r>
+              <a:rPr lang="en-AU" dirty="0"/>
+              <a:t>” &lt;</a:t>
+            </a:r>
+            <a:r>
+              <a:rPr lang="en-AU" dirty="0" err="1"/>
+              <a:t>trait_name</a:t>
+            </a:r>
+            <a:r>
+              <a:rPr lang="en-AU" dirty="0"/>
+              <a:t>&gt; </a:t>
+            </a:r>
+            <a:r>
+              <a:rPr lang="ru-RU" dirty="0"/>
+              <a:t>в качестве параметра</a:t>
+            </a:r>
+          </a:p>
+          <a:p>
+            <a:r>
+              <a:rPr lang="ru-RU" dirty="0"/>
+              <a:t>Передаваемый тип должен реализовывать </a:t>
+            </a:r>
+            <a:r>
+              <a:rPr lang="en-AU" dirty="0"/>
+              <a:t>trait Summary</a:t>
+            </a:r>
+            <a:endParaRPr lang="ru-RU" dirty="0"/>
+          </a:p>
+        </p:txBody>
+      </p:sp>
+      <p:pic>
+        <p:nvPicPr>
+          <p:cNvPr id="5" name="Рисунок 4">
+            <a:extLst>
+              <a:ext uri="{FF2B5EF4-FFF2-40B4-BE49-F238E27FC236}">
+                <a16:creationId xmlns:a16="http://schemas.microsoft.com/office/drawing/2014/main" id="{C0D49D86-10F9-5F0B-7F42-25D66F7CE1BB}"/>
+              </a:ext>
+            </a:extLst>
+          </p:cNvPr>
+          <p:cNvPicPr>
+            <a:picLocks noChangeAspect="1"/>
+          </p:cNvPicPr>
+          <p:nvPr/>
+        </p:nvPicPr>
+        <p:blipFill>
+          <a:blip r:embed="rId2"/>
+          <a:stretch>
+            <a:fillRect/>
+          </a:stretch>
+        </p:blipFill>
+        <p:spPr>
+          <a:xfrm>
+            <a:off x="3574719" y="5056775"/>
+            <a:ext cx="7779081" cy="1120188"/>
+          </a:xfrm>
+          <a:prstGeom prst="rect">
+            <a:avLst/>
+          </a:prstGeom>
+        </p:spPr>
+      </p:pic>
+      <p:pic>
+        <p:nvPicPr>
+          <p:cNvPr id="7" name="Рисунок 6">
+            <a:extLst>
+              <a:ext uri="{FF2B5EF4-FFF2-40B4-BE49-F238E27FC236}">
+                <a16:creationId xmlns:a16="http://schemas.microsoft.com/office/drawing/2014/main" id="{533ED1C3-73B7-5801-4C65-AC1CD37CF660}"/>
+              </a:ext>
+            </a:extLst>
+          </p:cNvPr>
+          <p:cNvPicPr>
+            <a:picLocks noChangeAspect="1"/>
+          </p:cNvPicPr>
+          <p:nvPr/>
+        </p:nvPicPr>
+        <p:blipFill>
+          <a:blip r:embed="rId3"/>
+          <a:stretch>
+            <a:fillRect/>
+          </a:stretch>
+        </p:blipFill>
+        <p:spPr>
+          <a:xfrm>
+            <a:off x="5836459" y="4029870"/>
+            <a:ext cx="5517341" cy="1120187"/>
+          </a:xfrm>
+          <a:prstGeom prst="rect">
+            <a:avLst/>
+          </a:prstGeom>
+        </p:spPr>
+      </p:pic>
+    </p:spTree>
+    <p:extLst>
+      <p:ext uri="{BB962C8B-B14F-4D97-AF65-F5344CB8AC3E}">
+        <p14:creationId xmlns:p14="http://schemas.microsoft.com/office/powerpoint/2010/main" val="2567964697"/>
+      </p:ext>
+    </p:extLst>
+  </p:cSld>
+  <p:clrMapOvr>
+    <a:masterClrMapping/>
+  </p:clrMapOvr>
+</p:sld>
+</file>
+
+<file path=ppt/slides/slide13.xml><?xml version="1.0" encoding="utf-8"?>
+<p:sld xmlns:a="http://schemas.openxmlformats.org/drawingml/2006/main" xmlns:r="http://schemas.openxmlformats.org/officeDocument/2006/relationships" xmlns:p="http://schemas.openxmlformats.org/presentationml/2006/main">
+  <p:cSld>
+    <p:spTree>
+      <p:nvGrpSpPr>
+        <p:cNvPr id="1" name=""/>
+        <p:cNvGrpSpPr/>
+        <p:nvPr/>
+      </p:nvGrpSpPr>
+      <p:grpSpPr>
+        <a:xfrm>
+          <a:off x="0" y="0"/>
+          <a:ext cx="0" cy="0"/>
+          <a:chOff x="0" y="0"/>
+          <a:chExt cx="0" cy="0"/>
+        </a:xfrm>
+      </p:grpSpPr>
+      <p:sp>
+        <p:nvSpPr>
+          <p:cNvPr id="3" name="Объект 2">
+            <a:extLst>
+              <a:ext uri="{FF2B5EF4-FFF2-40B4-BE49-F238E27FC236}">
+                <a16:creationId xmlns:a16="http://schemas.microsoft.com/office/drawing/2014/main" id="{1289956C-6191-4F75-80CE-5E008D305596}"/>
+              </a:ext>
+            </a:extLst>
+          </p:cNvPr>
+          <p:cNvSpPr>
+            <a:spLocks noGrp="1"/>
+          </p:cNvSpPr>
+          <p:nvPr>
+            <p:ph idx="1"/>
+          </p:nvPr>
+        </p:nvSpPr>
+        <p:spPr>
+          <a:xfrm>
+            <a:off x="871886" y="1108275"/>
+            <a:ext cx="10515600" cy="4351338"/>
+          </a:xfrm>
+        </p:spPr>
+        <p:txBody>
+          <a:bodyPr/>
+          <a:lstStyle/>
+          <a:p>
+            <a:r>
+              <a:rPr lang="ru-RU" dirty="0"/>
+              <a:t>Передавать типажи, как параметры можно и более подробным образом</a:t>
+            </a:r>
+          </a:p>
+          <a:p>
+            <a:r>
+              <a:rPr lang="ru-RU" dirty="0"/>
+              <a:t>Такой способ является более полным, прошлый пример – синтаксический сахар</a:t>
+            </a:r>
+          </a:p>
+          <a:p>
+            <a:r>
+              <a:rPr lang="ru-RU" dirty="0"/>
+              <a:t>Оба варианта работают одинаково</a:t>
+            </a:r>
+          </a:p>
+        </p:txBody>
+      </p:sp>
+      <p:sp>
+        <p:nvSpPr>
+          <p:cNvPr id="4" name="Заголовок 1">
+            <a:extLst>
+              <a:ext uri="{FF2B5EF4-FFF2-40B4-BE49-F238E27FC236}">
+                <a16:creationId xmlns:a16="http://schemas.microsoft.com/office/drawing/2014/main" id="{8FAD48CA-6525-0CAA-920D-E1ED37D6EB8A}"/>
+              </a:ext>
+            </a:extLst>
+          </p:cNvPr>
+          <p:cNvSpPr>
+            <a:spLocks noGrp="1"/>
+          </p:cNvSpPr>
+          <p:nvPr>
+            <p:ph type="title"/>
+          </p:nvPr>
+        </p:nvSpPr>
+        <p:spPr>
+          <a:xfrm>
+            <a:off x="838200" y="365125"/>
+            <a:ext cx="10515600" cy="1325563"/>
+          </a:xfrm>
+        </p:spPr>
+        <p:txBody>
+          <a:bodyPr/>
+          <a:lstStyle/>
+          <a:p>
+            <a:r>
+              <a:rPr lang="ru-RU" i="0" dirty="0">
+                <a:solidFill>
+                  <a:srgbClr val="000000"/>
+                </a:solidFill>
+                <a:effectLst/>
+                <a:latin typeface="Open Sans" panose="020B0606030504020204" pitchFamily="34" charset="0"/>
+              </a:rPr>
+              <a:t>Типажи как параметры (2/4)</a:t>
+            </a:r>
+            <a:br>
+              <a:rPr lang="ru-RU" i="0" dirty="0">
+                <a:solidFill>
+                  <a:srgbClr val="000000"/>
+                </a:solidFill>
+                <a:effectLst/>
+                <a:latin typeface="Open Sans" panose="020B0606030504020204" pitchFamily="34" charset="0"/>
+              </a:rPr>
+            </a:br>
+            <a:endParaRPr lang="ru-RU" dirty="0"/>
+          </a:p>
+        </p:txBody>
+      </p:sp>
+      <p:pic>
+        <p:nvPicPr>
+          <p:cNvPr id="6" name="Рисунок 5">
+            <a:extLst>
+              <a:ext uri="{FF2B5EF4-FFF2-40B4-BE49-F238E27FC236}">
+                <a16:creationId xmlns:a16="http://schemas.microsoft.com/office/drawing/2014/main" id="{454A8AFC-9B4C-7578-6F4C-AD55761429E5}"/>
+              </a:ext>
+            </a:extLst>
+          </p:cNvPr>
+          <p:cNvPicPr>
+            <a:picLocks noChangeAspect="1"/>
+          </p:cNvPicPr>
+          <p:nvPr/>
+        </p:nvPicPr>
+        <p:blipFill>
+          <a:blip r:embed="rId2"/>
+          <a:stretch>
+            <a:fillRect/>
+          </a:stretch>
+        </p:blipFill>
+        <p:spPr>
+          <a:xfrm>
+            <a:off x="4300178" y="3628160"/>
+            <a:ext cx="7053622" cy="1046574"/>
+          </a:xfrm>
+          <a:prstGeom prst="rect">
+            <a:avLst/>
+          </a:prstGeom>
+        </p:spPr>
+      </p:pic>
+      <p:pic>
+        <p:nvPicPr>
+          <p:cNvPr id="8" name="Рисунок 7">
+            <a:extLst>
+              <a:ext uri="{FF2B5EF4-FFF2-40B4-BE49-F238E27FC236}">
+                <a16:creationId xmlns:a16="http://schemas.microsoft.com/office/drawing/2014/main" id="{C2541973-D482-29CA-8359-B75F756CFE8F}"/>
+              </a:ext>
+            </a:extLst>
+          </p:cNvPr>
+          <p:cNvPicPr>
+            <a:picLocks noChangeAspect="1"/>
+          </p:cNvPicPr>
+          <p:nvPr/>
+        </p:nvPicPr>
+        <p:blipFill>
+          <a:blip r:embed="rId3"/>
+          <a:stretch>
+            <a:fillRect/>
+          </a:stretch>
+        </p:blipFill>
+        <p:spPr>
+          <a:xfrm>
+            <a:off x="838200" y="4809671"/>
+            <a:ext cx="10481914" cy="637540"/>
+          </a:xfrm>
+          <a:prstGeom prst="rect">
+            <a:avLst/>
+          </a:prstGeom>
+        </p:spPr>
+      </p:pic>
+      <p:pic>
+        <p:nvPicPr>
+          <p:cNvPr id="10" name="Рисунок 9">
+            <a:extLst>
+              <a:ext uri="{FF2B5EF4-FFF2-40B4-BE49-F238E27FC236}">
+                <a16:creationId xmlns:a16="http://schemas.microsoft.com/office/drawing/2014/main" id="{24C7C8E1-43C5-FCCE-ADDD-15E0ABBF9E27}"/>
+              </a:ext>
+            </a:extLst>
+          </p:cNvPr>
+          <p:cNvPicPr>
+            <a:picLocks noChangeAspect="1"/>
+          </p:cNvPicPr>
+          <p:nvPr/>
+        </p:nvPicPr>
+        <p:blipFill>
+          <a:blip r:embed="rId4"/>
+          <a:stretch>
+            <a:fillRect/>
+          </a:stretch>
+        </p:blipFill>
+        <p:spPr>
+          <a:xfrm>
+            <a:off x="838200" y="5459613"/>
+            <a:ext cx="8995962" cy="717350"/>
+          </a:xfrm>
+          <a:prstGeom prst="rect">
+            <a:avLst/>
+          </a:prstGeom>
+        </p:spPr>
+      </p:pic>
+    </p:spTree>
+    <p:extLst>
+      <p:ext uri="{BB962C8B-B14F-4D97-AF65-F5344CB8AC3E}">
+        <p14:creationId xmlns:p14="http://schemas.microsoft.com/office/powerpoint/2010/main" val="3390924487"/>
+      </p:ext>
+    </p:extLst>
+  </p:cSld>
+  <p:clrMapOvr>
+    <a:masterClrMapping/>
+  </p:clrMapOvr>
+</p:sld>
+</file>
+
+<file path=ppt/slides/slide14.xml><?xml version="1.0" encoding="utf-8"?>
+<p:sld xmlns:a="http://schemas.openxmlformats.org/drawingml/2006/main" xmlns:r="http://schemas.openxmlformats.org/officeDocument/2006/relationships" xmlns:p="http://schemas.openxmlformats.org/presentationml/2006/main">
+  <p:cSld>
+    <p:spTree>
+      <p:nvGrpSpPr>
+        <p:cNvPr id="1" name=""/>
+        <p:cNvGrpSpPr/>
+        <p:nvPr/>
+      </p:nvGrpSpPr>
+      <p:grpSpPr>
+        <a:xfrm>
+          <a:off x="0" y="0"/>
+          <a:ext cx="0" cy="0"/>
+          <a:chOff x="0" y="0"/>
+          <a:chExt cx="0" cy="0"/>
+        </a:xfrm>
+      </p:grpSpPr>
+      <p:sp>
+        <p:nvSpPr>
+          <p:cNvPr id="3" name="Объект 2">
+            <a:extLst>
+              <a:ext uri="{FF2B5EF4-FFF2-40B4-BE49-F238E27FC236}">
+                <a16:creationId xmlns:a16="http://schemas.microsoft.com/office/drawing/2014/main" id="{42F07FD3-0553-EF0C-D94B-10D096F3636C}"/>
+              </a:ext>
+            </a:extLst>
+          </p:cNvPr>
+          <p:cNvSpPr>
+            <a:spLocks noGrp="1"/>
+          </p:cNvSpPr>
+          <p:nvPr>
+            <p:ph idx="1"/>
+          </p:nvPr>
+        </p:nvSpPr>
+        <p:spPr/>
+        <p:txBody>
+          <a:bodyPr/>
+          <a:lstStyle/>
+          <a:p>
+            <a:r>
+              <a:rPr lang="ru-RU" dirty="0"/>
+              <a:t>Для использования нескольких типажей для одного аргумента существует синтаксис с оператором «+»</a:t>
+            </a:r>
+          </a:p>
+          <a:p>
+            <a:r>
+              <a:rPr lang="ru-RU" dirty="0"/>
+              <a:t>Параметр </a:t>
+            </a:r>
+            <a:r>
+              <a:rPr lang="en-AU" dirty="0"/>
+              <a:t>“item” </a:t>
+            </a:r>
+            <a:r>
+              <a:rPr lang="ru-RU" dirty="0"/>
+              <a:t>в данном примере должен реализовывать два типажа – «</a:t>
+            </a:r>
+            <a:r>
+              <a:rPr lang="en-AU" dirty="0"/>
+              <a:t>Summary</a:t>
+            </a:r>
+            <a:r>
+              <a:rPr lang="ru-RU" dirty="0"/>
+              <a:t>» и «</a:t>
+            </a:r>
+            <a:r>
+              <a:rPr lang="en-AU" dirty="0"/>
+              <a:t>Display</a:t>
+            </a:r>
+            <a:r>
+              <a:rPr lang="ru-RU" dirty="0"/>
+              <a:t>»</a:t>
+            </a:r>
+          </a:p>
+          <a:p>
+            <a:pPr marL="0" indent="0">
+              <a:buNone/>
+            </a:pPr>
+            <a:endParaRPr lang="ru-RU" dirty="0"/>
+          </a:p>
+        </p:txBody>
+      </p:sp>
+      <p:sp>
+        <p:nvSpPr>
+          <p:cNvPr id="4" name="Заголовок 1">
+            <a:extLst>
+              <a:ext uri="{FF2B5EF4-FFF2-40B4-BE49-F238E27FC236}">
+                <a16:creationId xmlns:a16="http://schemas.microsoft.com/office/drawing/2014/main" id="{2BC17ABE-4B74-E601-318E-A823CFD1047D}"/>
+              </a:ext>
+            </a:extLst>
+          </p:cNvPr>
+          <p:cNvSpPr>
+            <a:spLocks noGrp="1"/>
+          </p:cNvSpPr>
+          <p:nvPr>
+            <p:ph type="title"/>
+          </p:nvPr>
+        </p:nvSpPr>
+        <p:spPr>
+          <a:xfrm>
+            <a:off x="838200" y="365125"/>
+            <a:ext cx="10515600" cy="1325563"/>
+          </a:xfrm>
+        </p:spPr>
+        <p:txBody>
+          <a:bodyPr/>
+          <a:lstStyle/>
+          <a:p>
+            <a:r>
+              <a:rPr lang="ru-RU" i="0" dirty="0">
+                <a:solidFill>
+                  <a:srgbClr val="000000"/>
+                </a:solidFill>
+                <a:effectLst/>
+                <a:latin typeface="Open Sans" panose="020B0606030504020204" pitchFamily="34" charset="0"/>
+              </a:rPr>
+              <a:t>Типажи как параметры (3/4)</a:t>
+            </a:r>
+            <a:br>
+              <a:rPr lang="ru-RU" i="0" dirty="0">
+                <a:solidFill>
+                  <a:srgbClr val="000000"/>
+                </a:solidFill>
+                <a:effectLst/>
+                <a:latin typeface="Open Sans" panose="020B0606030504020204" pitchFamily="34" charset="0"/>
+              </a:rPr>
+            </a:br>
+            <a:endParaRPr lang="ru-RU" dirty="0"/>
+          </a:p>
+        </p:txBody>
+      </p:sp>
+      <p:pic>
+        <p:nvPicPr>
+          <p:cNvPr id="6" name="Рисунок 5">
+            <a:extLst>
+              <a:ext uri="{FF2B5EF4-FFF2-40B4-BE49-F238E27FC236}">
+                <a16:creationId xmlns:a16="http://schemas.microsoft.com/office/drawing/2014/main" id="{521135F6-84CF-A25C-E43D-4CC91E3FB7CA}"/>
+              </a:ext>
+            </a:extLst>
+          </p:cNvPr>
+          <p:cNvPicPr>
+            <a:picLocks noChangeAspect="1"/>
+          </p:cNvPicPr>
+          <p:nvPr/>
+        </p:nvPicPr>
+        <p:blipFill>
+          <a:blip r:embed="rId2"/>
+          <a:stretch>
+            <a:fillRect/>
+          </a:stretch>
+        </p:blipFill>
+        <p:spPr>
+          <a:xfrm>
+            <a:off x="1553706" y="4503260"/>
+            <a:ext cx="9084587" cy="695757"/>
+          </a:xfrm>
+          <a:prstGeom prst="rect">
+            <a:avLst/>
+          </a:prstGeom>
+        </p:spPr>
+      </p:pic>
+      <p:pic>
+        <p:nvPicPr>
+          <p:cNvPr id="8" name="Рисунок 7">
+            <a:extLst>
+              <a:ext uri="{FF2B5EF4-FFF2-40B4-BE49-F238E27FC236}">
+                <a16:creationId xmlns:a16="http://schemas.microsoft.com/office/drawing/2014/main" id="{108FABE9-53DE-E44A-5C1F-40B317A251BA}"/>
+              </a:ext>
+            </a:extLst>
+          </p:cNvPr>
+          <p:cNvPicPr>
+            <a:picLocks noChangeAspect="1"/>
+          </p:cNvPicPr>
+          <p:nvPr/>
+        </p:nvPicPr>
+        <p:blipFill>
+          <a:blip r:embed="rId3"/>
+          <a:stretch>
+            <a:fillRect/>
+          </a:stretch>
+        </p:blipFill>
+        <p:spPr>
+          <a:xfrm>
+            <a:off x="1553705" y="5205548"/>
+            <a:ext cx="9098613" cy="790303"/>
+          </a:xfrm>
+          <a:prstGeom prst="rect">
+            <a:avLst/>
+          </a:prstGeom>
+        </p:spPr>
+      </p:pic>
+    </p:spTree>
+    <p:extLst>
+      <p:ext uri="{BB962C8B-B14F-4D97-AF65-F5344CB8AC3E}">
+        <p14:creationId xmlns:p14="http://schemas.microsoft.com/office/powerpoint/2010/main" val="1171739609"/>
+      </p:ext>
+    </p:extLst>
+  </p:cSld>
+  <p:clrMapOvr>
+    <a:masterClrMapping/>
+  </p:clrMapOvr>
+</p:sld>
+</file>
+
+<file path=ppt/slides/slide15.xml><?xml version="1.0" encoding="utf-8"?>
+<p:sld xmlns:a="http://schemas.openxmlformats.org/drawingml/2006/main" xmlns:r="http://schemas.openxmlformats.org/officeDocument/2006/relationships" xmlns:p="http://schemas.openxmlformats.org/presentationml/2006/main">
+  <p:cSld>
+    <p:spTree>
+      <p:nvGrpSpPr>
+        <p:cNvPr id="1" name=""/>
+        <p:cNvGrpSpPr/>
+        <p:nvPr/>
+      </p:nvGrpSpPr>
+      <p:grpSpPr>
+        <a:xfrm>
+          <a:off x="0" y="0"/>
+          <a:ext cx="0" cy="0"/>
+          <a:chOff x="0" y="0"/>
+          <a:chExt cx="0" cy="0"/>
+        </a:xfrm>
+      </p:grpSpPr>
+      <p:sp>
+        <p:nvSpPr>
+          <p:cNvPr id="3" name="Объект 2">
+            <a:extLst>
+              <a:ext uri="{FF2B5EF4-FFF2-40B4-BE49-F238E27FC236}">
+                <a16:creationId xmlns:a16="http://schemas.microsoft.com/office/drawing/2014/main" id="{67730BE2-E3D5-8EAC-A3F7-61E6A2B759A3}"/>
+              </a:ext>
+            </a:extLst>
+          </p:cNvPr>
+          <p:cNvSpPr>
+            <a:spLocks noGrp="1"/>
+          </p:cNvSpPr>
+          <p:nvPr>
+            <p:ph idx="1"/>
+          </p:nvPr>
+        </p:nvSpPr>
+        <p:spPr/>
+        <p:txBody>
+          <a:bodyPr/>
+          <a:lstStyle/>
+          <a:p>
+            <a:r>
+              <a:rPr lang="ru-RU" dirty="0"/>
+              <a:t>Помимо предыдущих примеров можно передавать аргументы более понятным образом</a:t>
+            </a:r>
+          </a:p>
+          <a:p>
+            <a:endParaRPr lang="ru-RU" dirty="0"/>
+          </a:p>
+          <a:p>
+            <a:endParaRPr lang="ru-RU" dirty="0"/>
+          </a:p>
+          <a:p>
+            <a:endParaRPr lang="ru-RU" dirty="0"/>
+          </a:p>
+          <a:p>
+            <a:pPr marL="0" indent="0">
+              <a:buNone/>
+            </a:pPr>
+            <a:r>
+              <a:rPr lang="ru-RU" dirty="0"/>
+              <a:t>Вместо</a:t>
+            </a:r>
+          </a:p>
+        </p:txBody>
+      </p:sp>
+      <p:sp>
+        <p:nvSpPr>
+          <p:cNvPr id="4" name="Заголовок 1">
+            <a:extLst>
+              <a:ext uri="{FF2B5EF4-FFF2-40B4-BE49-F238E27FC236}">
+                <a16:creationId xmlns:a16="http://schemas.microsoft.com/office/drawing/2014/main" id="{EA5A2619-F8DC-8780-E3F2-D0A56BE7E196}"/>
+              </a:ext>
+            </a:extLst>
+          </p:cNvPr>
+          <p:cNvSpPr>
+            <a:spLocks noGrp="1"/>
+          </p:cNvSpPr>
+          <p:nvPr>
+            <p:ph type="title"/>
+          </p:nvPr>
+        </p:nvSpPr>
+        <p:spPr>
+          <a:xfrm>
+            <a:off x="838200" y="365125"/>
+            <a:ext cx="10515600" cy="1325563"/>
+          </a:xfrm>
+        </p:spPr>
+        <p:txBody>
+          <a:bodyPr/>
+          <a:lstStyle/>
+          <a:p>
+            <a:r>
+              <a:rPr lang="ru-RU" i="0" dirty="0">
+                <a:solidFill>
+                  <a:srgbClr val="000000"/>
+                </a:solidFill>
+                <a:effectLst/>
+                <a:latin typeface="Open Sans" panose="020B0606030504020204" pitchFamily="34" charset="0"/>
+              </a:rPr>
+              <a:t>Типажи как параметры (4/4)</a:t>
+            </a:r>
+            <a:br>
+              <a:rPr lang="ru-RU" b="1" i="0" dirty="0">
+                <a:solidFill>
+                  <a:srgbClr val="000000"/>
+                </a:solidFill>
+                <a:effectLst/>
+                <a:latin typeface="Open Sans" panose="020B0606030504020204" pitchFamily="34" charset="0"/>
+              </a:rPr>
+            </a:br>
+            <a:endParaRPr lang="ru-RU" dirty="0"/>
+          </a:p>
+        </p:txBody>
+      </p:sp>
+      <p:pic>
+        <p:nvPicPr>
+          <p:cNvPr id="6" name="Рисунок 5">
+            <a:extLst>
+              <a:ext uri="{FF2B5EF4-FFF2-40B4-BE49-F238E27FC236}">
+                <a16:creationId xmlns:a16="http://schemas.microsoft.com/office/drawing/2014/main" id="{0E8C540C-E22C-6A9B-7A59-1A900B2E5423}"/>
+              </a:ext>
+            </a:extLst>
+          </p:cNvPr>
+          <p:cNvPicPr>
+            <a:picLocks noChangeAspect="1"/>
+          </p:cNvPicPr>
+          <p:nvPr/>
+        </p:nvPicPr>
+        <p:blipFill>
+          <a:blip r:embed="rId2"/>
+          <a:stretch>
+            <a:fillRect/>
+          </a:stretch>
+        </p:blipFill>
+        <p:spPr>
+          <a:xfrm>
+            <a:off x="784107" y="4912751"/>
+            <a:ext cx="10623786" cy="513581"/>
+          </a:xfrm>
+          <a:prstGeom prst="rect">
+            <a:avLst/>
+          </a:prstGeom>
+        </p:spPr>
+      </p:pic>
+      <p:pic>
+        <p:nvPicPr>
+          <p:cNvPr id="8" name="Рисунок 7">
+            <a:extLst>
+              <a:ext uri="{FF2B5EF4-FFF2-40B4-BE49-F238E27FC236}">
+                <a16:creationId xmlns:a16="http://schemas.microsoft.com/office/drawing/2014/main" id="{7263F85A-2F0A-C046-90A7-5EED77145891}"/>
+              </a:ext>
+            </a:extLst>
+          </p:cNvPr>
+          <p:cNvPicPr>
+            <a:picLocks noChangeAspect="1"/>
+          </p:cNvPicPr>
+          <p:nvPr/>
+        </p:nvPicPr>
+        <p:blipFill>
+          <a:blip r:embed="rId3"/>
+          <a:stretch>
+            <a:fillRect/>
+          </a:stretch>
+        </p:blipFill>
+        <p:spPr>
+          <a:xfrm>
+            <a:off x="838200" y="2695879"/>
+            <a:ext cx="5515222" cy="1466242"/>
+          </a:xfrm>
+          <a:prstGeom prst="rect">
+            <a:avLst/>
+          </a:prstGeom>
+        </p:spPr>
+      </p:pic>
+    </p:spTree>
+    <p:extLst>
+      <p:ext uri="{BB962C8B-B14F-4D97-AF65-F5344CB8AC3E}">
+        <p14:creationId xmlns:p14="http://schemas.microsoft.com/office/powerpoint/2010/main" val="219525630"/>
+      </p:ext>
+    </p:extLst>
+  </p:cSld>
+  <p:clrMapOvr>
+    <a:masterClrMapping/>
+  </p:clrMapOvr>
+</p:sld>
+</file>
+
+<file path=ppt/slides/slide16.xml><?xml version="1.0" encoding="utf-8"?>
+<p:sld xmlns:a="http://schemas.openxmlformats.org/drawingml/2006/main" xmlns:r="http://schemas.openxmlformats.org/officeDocument/2006/relationships" xmlns:p="http://schemas.openxmlformats.org/presentationml/2006/main">
+  <p:cSld>
+    <p:spTree>
+      <p:nvGrpSpPr>
+        <p:cNvPr id="1" name=""/>
+        <p:cNvGrpSpPr/>
+        <p:nvPr/>
+      </p:nvGrpSpPr>
+      <p:grpSpPr>
+        <a:xfrm>
+          <a:off x="0" y="0"/>
+          <a:ext cx="0" cy="0"/>
+          <a:chOff x="0" y="0"/>
+          <a:chExt cx="0" cy="0"/>
+        </a:xfrm>
+      </p:grpSpPr>
+      <p:sp>
+        <p:nvSpPr>
+          <p:cNvPr id="2" name="Заголовок 1">
+            <a:extLst>
+              <a:ext uri="{FF2B5EF4-FFF2-40B4-BE49-F238E27FC236}">
+                <a16:creationId xmlns:a16="http://schemas.microsoft.com/office/drawing/2014/main" id="{45BEB553-D0C3-8FD9-4A48-F9B784445180}"/>
+              </a:ext>
+            </a:extLst>
+          </p:cNvPr>
+          <p:cNvSpPr>
+            <a:spLocks noGrp="1"/>
+          </p:cNvSpPr>
+          <p:nvPr>
+            <p:ph type="title"/>
+          </p:nvPr>
+        </p:nvSpPr>
+        <p:spPr>
+          <a:xfrm>
+            <a:off x="308453" y="34131"/>
+            <a:ext cx="11575093" cy="1325563"/>
+          </a:xfrm>
+        </p:spPr>
+        <p:txBody>
+          <a:bodyPr/>
+          <a:lstStyle/>
+          <a:p>
+            <a:r>
+              <a:rPr lang="ru-RU" dirty="0">
+                <a:latin typeface="Open Sans" panose="020B0606030504020204" pitchFamily="34" charset="0"/>
+                <a:ea typeface="Open Sans" panose="020B0606030504020204" pitchFamily="34" charset="0"/>
+                <a:cs typeface="Open Sans" panose="020B0606030504020204" pitchFamily="34" charset="0"/>
+              </a:rPr>
+              <a:t>Возврат значений, реализующих типаж</a:t>
+            </a:r>
+          </a:p>
+        </p:txBody>
+      </p:sp>
+      <p:sp>
+        <p:nvSpPr>
+          <p:cNvPr id="3" name="Объект 2">
+            <a:extLst>
+              <a:ext uri="{FF2B5EF4-FFF2-40B4-BE49-F238E27FC236}">
+                <a16:creationId xmlns:a16="http://schemas.microsoft.com/office/drawing/2014/main" id="{ADF32915-E85B-CF89-772C-48642AFEF195}"/>
+              </a:ext>
+            </a:extLst>
+          </p:cNvPr>
+          <p:cNvSpPr>
+            <a:spLocks noGrp="1"/>
+          </p:cNvSpPr>
+          <p:nvPr>
+            <p:ph idx="1"/>
+          </p:nvPr>
+        </p:nvSpPr>
+        <p:spPr>
+          <a:xfrm>
+            <a:off x="838200" y="1093060"/>
+            <a:ext cx="10515600" cy="4351338"/>
+          </a:xfrm>
+        </p:spPr>
+        <p:txBody>
+          <a:bodyPr/>
+          <a:lstStyle/>
+          <a:p>
+            <a:r>
+              <a:rPr lang="ru-RU" dirty="0"/>
+              <a:t>Для возвращения типа, реализующего типаж используется следующий синтаксис с </a:t>
+            </a:r>
+            <a:r>
+              <a:rPr lang="en-AU" dirty="0"/>
+              <a:t>“</a:t>
+            </a:r>
+            <a:r>
+              <a:rPr lang="en-AU" dirty="0" err="1"/>
+              <a:t>impl</a:t>
+            </a:r>
+            <a:r>
+              <a:rPr lang="en-AU" dirty="0"/>
+              <a:t>”</a:t>
+            </a:r>
+            <a:r>
+              <a:rPr lang="ru-RU" dirty="0"/>
+              <a:t>, реализуется полиморфизм</a:t>
+            </a:r>
+            <a:endParaRPr lang="en-AU" dirty="0"/>
+          </a:p>
+          <a:p>
+            <a:r>
+              <a:rPr lang="ru-RU" dirty="0"/>
+              <a:t>Достаточно не указывать конкретный тип, а указать типаж</a:t>
+            </a:r>
+          </a:p>
+        </p:txBody>
+      </p:sp>
+      <p:pic>
+        <p:nvPicPr>
+          <p:cNvPr id="5" name="Рисунок 4">
+            <a:extLst>
+              <a:ext uri="{FF2B5EF4-FFF2-40B4-BE49-F238E27FC236}">
+                <a16:creationId xmlns:a16="http://schemas.microsoft.com/office/drawing/2014/main" id="{E76E79D4-A7AE-C104-AEFF-7FB770AB5CDB}"/>
+              </a:ext>
+            </a:extLst>
+          </p:cNvPr>
+          <p:cNvPicPr>
+            <a:picLocks noChangeAspect="1"/>
+          </p:cNvPicPr>
+          <p:nvPr/>
+        </p:nvPicPr>
+        <p:blipFill>
+          <a:blip r:embed="rId2"/>
+          <a:stretch>
+            <a:fillRect/>
+          </a:stretch>
+        </p:blipFill>
+        <p:spPr>
+          <a:xfrm>
+            <a:off x="838200" y="2596094"/>
+            <a:ext cx="7221583" cy="2509715"/>
+          </a:xfrm>
+          <a:prstGeom prst="rect">
+            <a:avLst/>
+          </a:prstGeom>
+        </p:spPr>
+      </p:pic>
+      <p:pic>
+        <p:nvPicPr>
+          <p:cNvPr id="7" name="Рисунок 6">
+            <a:extLst>
+              <a:ext uri="{FF2B5EF4-FFF2-40B4-BE49-F238E27FC236}">
+                <a16:creationId xmlns:a16="http://schemas.microsoft.com/office/drawing/2014/main" id="{04EC9215-5C8E-D33F-E08B-71687A479CA8}"/>
+              </a:ext>
+            </a:extLst>
+          </p:cNvPr>
+          <p:cNvPicPr>
+            <a:picLocks noChangeAspect="1"/>
+          </p:cNvPicPr>
+          <p:nvPr/>
+        </p:nvPicPr>
+        <p:blipFill>
+          <a:blip r:embed="rId3"/>
+          <a:stretch>
+            <a:fillRect/>
+          </a:stretch>
+        </p:blipFill>
+        <p:spPr>
+          <a:xfrm>
+            <a:off x="5153366" y="3996665"/>
+            <a:ext cx="6200434" cy="2827204"/>
+          </a:xfrm>
+          <a:prstGeom prst="rect">
+            <a:avLst/>
+          </a:prstGeom>
+        </p:spPr>
+      </p:pic>
+    </p:spTree>
+    <p:extLst>
+      <p:ext uri="{BB962C8B-B14F-4D97-AF65-F5344CB8AC3E}">
+        <p14:creationId xmlns:p14="http://schemas.microsoft.com/office/powerpoint/2010/main" val="3553306892"/>
+      </p:ext>
+    </p:extLst>
+  </p:cSld>
+  <p:clrMapOvr>
+    <a:masterClrMapping/>
+  </p:clrMapOvr>
+</p:sld>
+</file>
+
+<file path=ppt/slides/slide17.xml><?xml version="1.0" encoding="utf-8"?>
+<p:sld xmlns:a="http://schemas.openxmlformats.org/drawingml/2006/main" xmlns:r="http://schemas.openxmlformats.org/officeDocument/2006/relationships" xmlns:p="http://schemas.openxmlformats.org/presentationml/2006/main">
+  <p:cSld>
+    <p:spTree>
+      <p:nvGrpSpPr>
+        <p:cNvPr id="1" name=""/>
+        <p:cNvGrpSpPr/>
+        <p:nvPr/>
+      </p:nvGrpSpPr>
+      <p:grpSpPr>
+        <a:xfrm>
+          <a:off x="0" y="0"/>
+          <a:ext cx="0" cy="0"/>
+          <a:chOff x="0" y="0"/>
+          <a:chExt cx="0" cy="0"/>
+        </a:xfrm>
+      </p:grpSpPr>
+      <p:sp>
+        <p:nvSpPr>
+          <p:cNvPr id="2" name="Заголовок 1">
+            <a:extLst>
+              <a:ext uri="{FF2B5EF4-FFF2-40B4-BE49-F238E27FC236}">
+                <a16:creationId xmlns:a16="http://schemas.microsoft.com/office/drawing/2014/main" id="{A698AA44-CD92-95AC-C9F2-D7C5EF86787E}"/>
+              </a:ext>
+            </a:extLst>
+          </p:cNvPr>
+          <p:cNvSpPr>
+            <a:spLocks noGrp="1"/>
+          </p:cNvSpPr>
+          <p:nvPr>
+            <p:ph type="title"/>
+          </p:nvPr>
+        </p:nvSpPr>
+        <p:spPr/>
+        <p:txBody>
+          <a:bodyPr/>
+          <a:lstStyle/>
+          <a:p>
+            <a:r>
+              <a:rPr lang="ru-RU" dirty="0">
+                <a:latin typeface="Open Sans" panose="020B0606030504020204" pitchFamily="34" charset="0"/>
+                <a:ea typeface="Open Sans" panose="020B0606030504020204" pitchFamily="34" charset="0"/>
+                <a:cs typeface="Open Sans" panose="020B0606030504020204" pitchFamily="34" charset="0"/>
+              </a:rPr>
+              <a:t>Типажи для создания методов</a:t>
+            </a:r>
+          </a:p>
+        </p:txBody>
+      </p:sp>
+      <p:pic>
+        <p:nvPicPr>
+          <p:cNvPr id="7" name="Рисунок 6">
+            <a:extLst>
+              <a:ext uri="{FF2B5EF4-FFF2-40B4-BE49-F238E27FC236}">
+                <a16:creationId xmlns:a16="http://schemas.microsoft.com/office/drawing/2014/main" id="{C807F945-FE83-D45F-953A-15C51E931720}"/>
+              </a:ext>
+            </a:extLst>
+          </p:cNvPr>
+          <p:cNvPicPr>
+            <a:picLocks noChangeAspect="1"/>
+          </p:cNvPicPr>
+          <p:nvPr/>
+        </p:nvPicPr>
+        <p:blipFill>
+          <a:blip r:embed="rId2"/>
+          <a:stretch>
+            <a:fillRect/>
+          </a:stretch>
+        </p:blipFill>
+        <p:spPr>
+          <a:xfrm>
+            <a:off x="567208" y="1690688"/>
+            <a:ext cx="6933098" cy="2698432"/>
+          </a:xfrm>
+          <a:prstGeom prst="rect">
+            <a:avLst/>
+          </a:prstGeom>
+        </p:spPr>
+      </p:pic>
+      <p:pic>
+        <p:nvPicPr>
+          <p:cNvPr id="9" name="Рисунок 8">
+            <a:extLst>
+              <a:ext uri="{FF2B5EF4-FFF2-40B4-BE49-F238E27FC236}">
+                <a16:creationId xmlns:a16="http://schemas.microsoft.com/office/drawing/2014/main" id="{C0666FEF-5CF5-4044-7B34-32B21807DF29}"/>
+              </a:ext>
+            </a:extLst>
+          </p:cNvPr>
+          <p:cNvPicPr>
+            <a:picLocks noChangeAspect="1"/>
+          </p:cNvPicPr>
+          <p:nvPr/>
+        </p:nvPicPr>
+        <p:blipFill>
+          <a:blip r:embed="rId3"/>
+          <a:stretch>
+            <a:fillRect/>
+          </a:stretch>
+        </p:blipFill>
+        <p:spPr>
+          <a:xfrm>
+            <a:off x="3560196" y="4036980"/>
+            <a:ext cx="8198321" cy="2619498"/>
+          </a:xfrm>
+          <a:prstGeom prst="rect">
+            <a:avLst/>
+          </a:prstGeom>
+        </p:spPr>
+      </p:pic>
+    </p:spTree>
+    <p:extLst>
+      <p:ext uri="{BB962C8B-B14F-4D97-AF65-F5344CB8AC3E}">
+        <p14:creationId xmlns:p14="http://schemas.microsoft.com/office/powerpoint/2010/main" val="3576659198"/>
+      </p:ext>
+    </p:extLst>
+  </p:cSld>
+  <p:clrMapOvr>
+    <a:masterClrMapping/>
+  </p:clrMapOvr>
+</p:sld>
+</file>
+
+<file path=ppt/slides/slide18.xml><?xml version="1.0" encoding="utf-8"?>
+<p:sld xmlns:a="http://schemas.openxmlformats.org/drawingml/2006/main" xmlns:r="http://schemas.openxmlformats.org/officeDocument/2006/relationships" xmlns:p="http://schemas.openxmlformats.org/presentationml/2006/main">
+  <p:cSld>
+    <p:spTree>
+      <p:nvGrpSpPr>
+        <p:cNvPr id="1" name=""/>
+        <p:cNvGrpSpPr/>
+        <p:nvPr/>
+      </p:nvGrpSpPr>
+      <p:grpSpPr>
+        <a:xfrm>
+          <a:off x="0" y="0"/>
+          <a:ext cx="0" cy="0"/>
+          <a:chOff x="0" y="0"/>
+          <a:chExt cx="0" cy="0"/>
+        </a:xfrm>
+      </p:grpSpPr>
+      <p:sp>
+        <p:nvSpPr>
+          <p:cNvPr id="2" name="Заголовок 1">
+            <a:extLst>
+              <a:ext uri="{FF2B5EF4-FFF2-40B4-BE49-F238E27FC236}">
                 <a16:creationId xmlns:a16="http://schemas.microsoft.com/office/drawing/2014/main" id="{3B020788-B501-7844-AD7D-77D64EB0C490}"/>
               </a:ext>
             </a:extLst>
@@ -3841,7 +4961,7 @@
 </p:sld>
 </file>
 
-<file path=ppt/slides/slide13.xml><?xml version="1.0" encoding="utf-8"?>
+<file path=ppt/slides/slide19.xml><?xml version="1.0" encoding="utf-8"?>
 <p:sld xmlns:a="http://schemas.openxmlformats.org/drawingml/2006/main" xmlns:r="http://schemas.openxmlformats.org/officeDocument/2006/relationships" xmlns:p="http://schemas.openxmlformats.org/presentationml/2006/main">
   <p:cSld>
     <p:spTree>
@@ -4265,7 +5385,7 @@
         </p:blipFill>
         <p:spPr>
           <a:xfrm>
-            <a:off x="0" y="1390261"/>
+            <a:off x="0" y="1372162"/>
             <a:ext cx="4545059" cy="5467739"/>
           </a:xfrm>
           <a:prstGeom prst="rect">
@@ -4273,12 +5393,370 @@
           </a:prstGeom>
         </p:spPr>
       </p:pic>
+      <p:sp>
+        <p:nvSpPr>
+          <p:cNvPr id="23" name="TextBox 22">
+            <a:extLst>
+              <a:ext uri="{FF2B5EF4-FFF2-40B4-BE49-F238E27FC236}">
+                <a16:creationId xmlns:a16="http://schemas.microsoft.com/office/drawing/2014/main" id="{81E89C54-ED10-7BD3-5B9A-C3FF998D2057}"/>
+              </a:ext>
+            </a:extLst>
+          </p:cNvPr>
+          <p:cNvSpPr txBox="1"/>
+          <p:nvPr/>
+        </p:nvSpPr>
+        <p:spPr>
+          <a:xfrm>
+            <a:off x="4545059" y="1372162"/>
+            <a:ext cx="3022068" cy="4832092"/>
+          </a:xfrm>
+          <a:prstGeom prst="rect">
+            <a:avLst/>
+          </a:prstGeom>
+          <a:noFill/>
+        </p:spPr>
+        <p:txBody>
+          <a:bodyPr wrap="square">
+            <a:spAutoFit/>
+          </a:bodyPr>
+          <a:lstStyle/>
+          <a:p>
+            <a:r>
+              <a:rPr lang="en-US" sz="1600" u="sng" dirty="0">
+                <a:latin typeface="Courier New" panose="02070309020205020404" pitchFamily="49" charset="0"/>
+                <a:cs typeface="Courier New" panose="02070309020205020404" pitchFamily="49" charset="0"/>
+              </a:rPr>
+              <a:t>Console:</a:t>
+            </a:r>
+          </a:p>
+          <a:p>
+            <a:r>
+              <a:rPr lang="en-US" sz="1200" dirty="0">
+                <a:latin typeface="Courier New" panose="02070309020205020404" pitchFamily="49" charset="0"/>
+                <a:cs typeface="Courier New" panose="02070309020205020404" pitchFamily="49" charset="0"/>
+              </a:rPr>
+              <a:t>$ cargo run</a:t>
+            </a:r>
+          </a:p>
+          <a:p>
+            <a:r>
+              <a:rPr lang="en-US" sz="1200" dirty="0">
+                <a:latin typeface="Courier New" panose="02070309020205020404" pitchFamily="49" charset="0"/>
+                <a:cs typeface="Courier New" panose="02070309020205020404" pitchFamily="49" charset="0"/>
+              </a:rPr>
+              <a:t>   Compiling chapter10 v0.1.0 (file:///projects/chapter10)</a:t>
+            </a:r>
+          </a:p>
+          <a:p>
+            <a:r>
+              <a:rPr lang="en-US" sz="1200" dirty="0">
+                <a:latin typeface="Courier New" panose="02070309020205020404" pitchFamily="49" charset="0"/>
+                <a:cs typeface="Courier New" panose="02070309020205020404" pitchFamily="49" charset="0"/>
+              </a:rPr>
+              <a:t>error[E0369]: binary operation `&gt;` cannot be applied to type `&amp;T`</a:t>
+            </a:r>
+          </a:p>
+          <a:p>
+            <a:r>
+              <a:rPr lang="en-US" sz="1200" dirty="0">
+                <a:latin typeface="Courier New" panose="02070309020205020404" pitchFamily="49" charset="0"/>
+                <a:cs typeface="Courier New" panose="02070309020205020404" pitchFamily="49" charset="0"/>
+              </a:rPr>
+              <a:t> --&gt; </a:t>
+            </a:r>
+            <a:r>
+              <a:rPr lang="en-US" sz="1200" dirty="0" err="1">
+                <a:latin typeface="Courier New" panose="02070309020205020404" pitchFamily="49" charset="0"/>
+                <a:cs typeface="Courier New" panose="02070309020205020404" pitchFamily="49" charset="0"/>
+              </a:rPr>
+              <a:t>src</a:t>
+            </a:r>
+            <a:r>
+              <a:rPr lang="en-US" sz="1200" dirty="0">
+                <a:latin typeface="Courier New" panose="02070309020205020404" pitchFamily="49" charset="0"/>
+                <a:cs typeface="Courier New" panose="02070309020205020404" pitchFamily="49" charset="0"/>
+              </a:rPr>
+              <a:t>/main.rs:5:17</a:t>
+            </a:r>
+          </a:p>
+          <a:p>
+            <a:r>
+              <a:rPr lang="en-US" sz="1200" dirty="0">
+                <a:latin typeface="Courier New" panose="02070309020205020404" pitchFamily="49" charset="0"/>
+                <a:cs typeface="Courier New" panose="02070309020205020404" pitchFamily="49" charset="0"/>
+              </a:rPr>
+              <a:t>  |</a:t>
+            </a:r>
+          </a:p>
+          <a:p>
+            <a:r>
+              <a:rPr lang="en-US" sz="1200" dirty="0">
+                <a:latin typeface="Courier New" panose="02070309020205020404" pitchFamily="49" charset="0"/>
+                <a:cs typeface="Courier New" panose="02070309020205020404" pitchFamily="49" charset="0"/>
+              </a:rPr>
+              <a:t>5 |         if item &gt; largest {</a:t>
+            </a:r>
+          </a:p>
+          <a:p>
+            <a:r>
+              <a:rPr lang="en-US" sz="1200" dirty="0">
+                <a:latin typeface="Courier New" panose="02070309020205020404" pitchFamily="49" charset="0"/>
+                <a:cs typeface="Courier New" panose="02070309020205020404" pitchFamily="49" charset="0"/>
+              </a:rPr>
+              <a:t>  |            ---- ^ ------- &amp;T</a:t>
+            </a:r>
+          </a:p>
+          <a:p>
+            <a:r>
+              <a:rPr lang="en-US" sz="1200" dirty="0">
+                <a:latin typeface="Courier New" panose="02070309020205020404" pitchFamily="49" charset="0"/>
+                <a:cs typeface="Courier New" panose="02070309020205020404" pitchFamily="49" charset="0"/>
+              </a:rPr>
+              <a:t>  |            |</a:t>
+            </a:r>
+          </a:p>
+          <a:p>
+            <a:r>
+              <a:rPr lang="en-US" sz="1200" dirty="0">
+                <a:latin typeface="Courier New" panose="02070309020205020404" pitchFamily="49" charset="0"/>
+                <a:cs typeface="Courier New" panose="02070309020205020404" pitchFamily="49" charset="0"/>
+              </a:rPr>
+              <a:t>  |            &amp;T</a:t>
+            </a:r>
+          </a:p>
+          <a:p>
+            <a:r>
+              <a:rPr lang="en-US" sz="1200" dirty="0">
+                <a:latin typeface="Courier New" panose="02070309020205020404" pitchFamily="49" charset="0"/>
+                <a:cs typeface="Courier New" panose="02070309020205020404" pitchFamily="49" charset="0"/>
+              </a:rPr>
+              <a:t>  |</a:t>
+            </a:r>
+          </a:p>
+          <a:p>
+            <a:r>
+              <a:rPr lang="en-US" sz="1200" dirty="0">
+                <a:latin typeface="Courier New" panose="02070309020205020404" pitchFamily="49" charset="0"/>
+                <a:cs typeface="Courier New" panose="02070309020205020404" pitchFamily="49" charset="0"/>
+              </a:rPr>
+              <a:t>help: consider restricting type parameter `T`</a:t>
+            </a:r>
+          </a:p>
+          <a:p>
+            <a:r>
+              <a:rPr lang="en-US" sz="1200" dirty="0">
+                <a:latin typeface="Courier New" panose="02070309020205020404" pitchFamily="49" charset="0"/>
+                <a:cs typeface="Courier New" panose="02070309020205020404" pitchFamily="49" charset="0"/>
+              </a:rPr>
+              <a:t>  |</a:t>
+            </a:r>
+          </a:p>
+          <a:p>
+            <a:r>
+              <a:rPr lang="en-US" sz="1200" dirty="0">
+                <a:latin typeface="Courier New" panose="02070309020205020404" pitchFamily="49" charset="0"/>
+                <a:cs typeface="Courier New" panose="02070309020205020404" pitchFamily="49" charset="0"/>
+              </a:rPr>
+              <a:t>1 | fn largest&lt;T: std::</a:t>
+            </a:r>
+            <a:r>
+              <a:rPr lang="en-US" sz="1200" dirty="0" err="1">
+                <a:latin typeface="Courier New" panose="02070309020205020404" pitchFamily="49" charset="0"/>
+                <a:cs typeface="Courier New" panose="02070309020205020404" pitchFamily="49" charset="0"/>
+              </a:rPr>
+              <a:t>cmp</a:t>
+            </a:r>
+            <a:r>
+              <a:rPr lang="en-US" sz="1200" dirty="0">
+                <a:latin typeface="Courier New" panose="02070309020205020404" pitchFamily="49" charset="0"/>
+                <a:cs typeface="Courier New" panose="02070309020205020404" pitchFamily="49" charset="0"/>
+              </a:rPr>
+              <a:t>::</a:t>
+            </a:r>
+            <a:r>
+              <a:rPr lang="en-US" sz="1200" dirty="0" err="1">
+                <a:latin typeface="Courier New" panose="02070309020205020404" pitchFamily="49" charset="0"/>
+                <a:cs typeface="Courier New" panose="02070309020205020404" pitchFamily="49" charset="0"/>
+              </a:rPr>
+              <a:t>PartialOrd</a:t>
+            </a:r>
+            <a:r>
+              <a:rPr lang="en-US" sz="1200" dirty="0">
+                <a:latin typeface="Courier New" panose="02070309020205020404" pitchFamily="49" charset="0"/>
+                <a:cs typeface="Courier New" panose="02070309020205020404" pitchFamily="49" charset="0"/>
+              </a:rPr>
+              <a:t>&gt;(list: &amp;[T]) -&gt; &amp;T {</a:t>
+            </a:r>
+          </a:p>
+          <a:p>
+            <a:r>
+              <a:rPr lang="en-US" sz="1200" dirty="0">
+                <a:latin typeface="Courier New" panose="02070309020205020404" pitchFamily="49" charset="0"/>
+                <a:cs typeface="Courier New" panose="02070309020205020404" pitchFamily="49" charset="0"/>
+              </a:rPr>
+              <a:t>  |             ++++++++++++++++++++++</a:t>
+            </a:r>
+          </a:p>
+          <a:p>
+            <a:endParaRPr lang="en-US" sz="1600" u="sng" dirty="0">
+              <a:latin typeface="Courier New" panose="02070309020205020404" pitchFamily="49" charset="0"/>
+              <a:cs typeface="Courier New" panose="02070309020205020404" pitchFamily="49" charset="0"/>
+            </a:endParaRPr>
+          </a:p>
+        </p:txBody>
+      </p:sp>
+      <p:sp>
+        <p:nvSpPr>
+          <p:cNvPr id="26" name="TextBox 25">
+            <a:extLst>
+              <a:ext uri="{FF2B5EF4-FFF2-40B4-BE49-F238E27FC236}">
+                <a16:creationId xmlns:a16="http://schemas.microsoft.com/office/drawing/2014/main" id="{B81D65CA-86B1-70EE-F5CD-04E4B5BB2E7E}"/>
+              </a:ext>
+            </a:extLst>
+          </p:cNvPr>
+          <p:cNvSpPr txBox="1"/>
+          <p:nvPr/>
+        </p:nvSpPr>
+        <p:spPr>
+          <a:xfrm>
+            <a:off x="7294430" y="5193483"/>
+            <a:ext cx="4666357" cy="1754326"/>
+          </a:xfrm>
+          <a:prstGeom prst="rect">
+            <a:avLst/>
+          </a:prstGeom>
+          <a:noFill/>
+        </p:spPr>
+        <p:txBody>
+          <a:bodyPr wrap="square" rtlCol="0">
+            <a:spAutoFit/>
+          </a:bodyPr>
+          <a:lstStyle/>
+          <a:p>
+            <a:r>
+              <a:rPr lang="ru-RU" u="sng" dirty="0">
+                <a:solidFill>
+                  <a:srgbClr val="FF0000"/>
+                </a:solidFill>
+              </a:rPr>
+              <a:t>Ошибка: </a:t>
+            </a:r>
+          </a:p>
+          <a:p>
+            <a:r>
+              <a:rPr kumimoji="0" lang="ru-RU" altLang="ru-RU" sz="1800" b="0" i="0" u="none" strike="noStrike" cap="none" normalizeH="0" baseline="0" dirty="0">
+                <a:ln>
+                  <a:noFill/>
+                </a:ln>
+                <a:solidFill>
+                  <a:schemeClr val="tx1"/>
+                </a:solidFill>
+                <a:effectLst/>
+                <a:latin typeface="Arial" panose="020B0604020202020204" pitchFamily="34" charset="0"/>
+              </a:rPr>
+              <a:t>функция не будет работать для всех </a:t>
+            </a:r>
+          </a:p>
+          <a:p>
+            <a:r>
+              <a:rPr kumimoji="0" lang="ru-RU" altLang="ru-RU" sz="1800" b="0" i="0" u="none" strike="noStrike" cap="none" normalizeH="0" baseline="0" dirty="0">
+                <a:ln>
+                  <a:noFill/>
+                </a:ln>
+                <a:solidFill>
+                  <a:schemeClr val="tx1"/>
+                </a:solidFill>
+                <a:effectLst/>
+                <a:latin typeface="Arial" panose="020B0604020202020204" pitchFamily="34" charset="0"/>
+              </a:rPr>
+              <a:t>возможных типо</a:t>
+            </a:r>
+            <a:r>
+              <a:rPr lang="ru-RU" altLang="ru-RU" dirty="0">
+                <a:latin typeface="Arial" panose="020B0604020202020204" pitchFamily="34" charset="0"/>
+              </a:rPr>
+              <a:t>в </a:t>
+            </a:r>
+            <a:r>
+              <a:rPr lang="en-US" altLang="ru-RU" dirty="0">
+                <a:solidFill>
+                  <a:schemeClr val="accent1"/>
+                </a:solidFill>
+                <a:latin typeface="Arial" panose="020B0604020202020204" pitchFamily="34" charset="0"/>
+              </a:rPr>
+              <a:t>T</a:t>
+            </a:r>
+          </a:p>
+          <a:p>
+            <a:r>
+              <a:rPr kumimoji="0" lang="ru-RU" altLang="ru-RU" sz="1800" b="0" i="0" u="none" strike="noStrike" cap="none" normalizeH="0" baseline="0" dirty="0">
+                <a:ln>
+                  <a:noFill/>
+                </a:ln>
+                <a:effectLst/>
+                <a:latin typeface="Arial" panose="020B0604020202020204" pitchFamily="34" charset="0"/>
+              </a:rPr>
+              <a:t>Типы, которые</a:t>
+            </a:r>
+            <a:r>
+              <a:rPr lang="ru-RU" altLang="ru-RU" dirty="0">
+                <a:latin typeface="Arial" panose="020B0604020202020204" pitchFamily="34" charset="0"/>
+              </a:rPr>
+              <a:t> можно </a:t>
+            </a:r>
+            <a:r>
+              <a:rPr lang="ru-RU" altLang="ru-RU" dirty="0">
+                <a:solidFill>
+                  <a:schemeClr val="accent1"/>
+                </a:solidFill>
+                <a:latin typeface="Arial" panose="020B0604020202020204" pitchFamily="34" charset="0"/>
+              </a:rPr>
+              <a:t>упорядочивать</a:t>
+            </a:r>
+          </a:p>
+          <a:p>
+            <a:r>
+              <a:rPr kumimoji="0" lang="ru-RU" altLang="ru-RU" sz="1800" b="0" i="0" u="none" strike="noStrike" cap="none" normalizeH="0" baseline="0" dirty="0">
+                <a:ln>
+                  <a:noFill/>
+                </a:ln>
+                <a:effectLst/>
+                <a:latin typeface="Arial" panose="020B0604020202020204" pitchFamily="34" charset="0"/>
+              </a:rPr>
+              <a:t>Для сравнений: </a:t>
+            </a:r>
+            <a:r>
+              <a:rPr lang="it-IT" b="0" i="1" dirty="0">
+                <a:solidFill>
+                  <a:schemeClr val="accent1"/>
+                </a:solidFill>
+                <a:effectLst/>
+                <a:latin typeface="Consolas" panose="020B0609020204030204" pitchFamily="49" charset="0"/>
+              </a:rPr>
+              <a:t>std::cmp::PartialOrd</a:t>
+            </a:r>
+            <a:endParaRPr kumimoji="0" lang="ru-RU" altLang="ru-RU" sz="1800" b="0" i="0" u="none" strike="noStrike" cap="none" normalizeH="0" baseline="0" dirty="0">
+              <a:ln>
+                <a:noFill/>
+              </a:ln>
+              <a:solidFill>
+                <a:schemeClr val="accent1"/>
+              </a:solidFill>
+              <a:effectLst/>
+              <a:latin typeface="Arial" panose="020B0604020202020204" pitchFamily="34" charset="0"/>
+            </a:endParaRPr>
+          </a:p>
+          <a:p>
+            <a:endParaRPr lang="ru-RU" dirty="0"/>
+          </a:p>
+        </p:txBody>
+      </p:sp>
       <p:pic>
         <p:nvPicPr>
-          <p:cNvPr id="16" name="Рисунок 15">
-            <a:extLst>
-              <a:ext uri="{FF2B5EF4-FFF2-40B4-BE49-F238E27FC236}">
-                <a16:creationId xmlns:a16="http://schemas.microsoft.com/office/drawing/2014/main" id="{B239F77E-0C21-87AD-B7A3-D9026EF5A2B4}"/>
+          <p:cNvPr id="4" name="Рисунок 3">
+            <a:extLst>
+              <a:ext uri="{FF2B5EF4-FFF2-40B4-BE49-F238E27FC236}">
+                <a16:creationId xmlns:a16="http://schemas.microsoft.com/office/drawing/2014/main" id="{97BEC4C6-72D1-C7CA-6CE4-20905867327A}"/>
               </a:ext>
             </a:extLst>
           </p:cNvPr>
@@ -4295,372 +5773,14 @@
         </p:blipFill>
         <p:spPr>
           <a:xfrm>
-            <a:off x="7374245" y="1125898"/>
-            <a:ext cx="4817755" cy="4067585"/>
+            <a:off x="7398545" y="1372161"/>
+            <a:ext cx="4246059" cy="3894881"/>
           </a:xfrm>
           <a:prstGeom prst="rect">
             <a:avLst/>
           </a:prstGeom>
         </p:spPr>
       </p:pic>
-      <p:sp>
-        <p:nvSpPr>
-          <p:cNvPr id="23" name="TextBox 22">
-            <a:extLst>
-              <a:ext uri="{FF2B5EF4-FFF2-40B4-BE49-F238E27FC236}">
-                <a16:creationId xmlns:a16="http://schemas.microsoft.com/office/drawing/2014/main" id="{81E89C54-ED10-7BD3-5B9A-C3FF998D2057}"/>
-              </a:ext>
-            </a:extLst>
-          </p:cNvPr>
-          <p:cNvSpPr txBox="1"/>
-          <p:nvPr/>
-        </p:nvSpPr>
-        <p:spPr>
-          <a:xfrm>
-            <a:off x="4545059" y="1372162"/>
-            <a:ext cx="3022068" cy="4832092"/>
-          </a:xfrm>
-          <a:prstGeom prst="rect">
-            <a:avLst/>
-          </a:prstGeom>
-          <a:noFill/>
-        </p:spPr>
-        <p:txBody>
-          <a:bodyPr wrap="square">
-            <a:spAutoFit/>
-          </a:bodyPr>
-          <a:lstStyle/>
-          <a:p>
-            <a:r>
-              <a:rPr lang="en-US" sz="1600" u="sng" dirty="0">
-                <a:latin typeface="Courier New" panose="02070309020205020404" pitchFamily="49" charset="0"/>
-                <a:cs typeface="Courier New" panose="02070309020205020404" pitchFamily="49" charset="0"/>
-              </a:rPr>
-              <a:t>Console:</a:t>
-            </a:r>
-          </a:p>
-          <a:p>
-            <a:r>
-              <a:rPr lang="en-US" sz="1200" dirty="0">
-                <a:latin typeface="Courier New" panose="02070309020205020404" pitchFamily="49" charset="0"/>
-                <a:cs typeface="Courier New" panose="02070309020205020404" pitchFamily="49" charset="0"/>
-              </a:rPr>
-              <a:t>$ cargo run</a:t>
-            </a:r>
-          </a:p>
-          <a:p>
-            <a:r>
-              <a:rPr lang="en-US" sz="1200" dirty="0">
-                <a:latin typeface="Courier New" panose="02070309020205020404" pitchFamily="49" charset="0"/>
-                <a:cs typeface="Courier New" panose="02070309020205020404" pitchFamily="49" charset="0"/>
-              </a:rPr>
-              <a:t>   Compiling chapter10 v0.1.0 (file:///projects/chapter10)</a:t>
-            </a:r>
-          </a:p>
-          <a:p>
-            <a:r>
-              <a:rPr lang="en-US" sz="1200" dirty="0">
-                <a:latin typeface="Courier New" panose="02070309020205020404" pitchFamily="49" charset="0"/>
-                <a:cs typeface="Courier New" panose="02070309020205020404" pitchFamily="49" charset="0"/>
-              </a:rPr>
-              <a:t>error[E0369]: binary operation `&gt;` cannot be applied to type `&amp;T`</a:t>
-            </a:r>
-          </a:p>
-          <a:p>
-            <a:r>
-              <a:rPr lang="en-US" sz="1200" dirty="0">
-                <a:latin typeface="Courier New" panose="02070309020205020404" pitchFamily="49" charset="0"/>
-                <a:cs typeface="Courier New" panose="02070309020205020404" pitchFamily="49" charset="0"/>
-              </a:rPr>
-              <a:t> --&gt; </a:t>
-            </a:r>
-            <a:r>
-              <a:rPr lang="en-US" sz="1200" dirty="0" err="1">
-                <a:latin typeface="Courier New" panose="02070309020205020404" pitchFamily="49" charset="0"/>
-                <a:cs typeface="Courier New" panose="02070309020205020404" pitchFamily="49" charset="0"/>
-              </a:rPr>
-              <a:t>src</a:t>
-            </a:r>
-            <a:r>
-              <a:rPr lang="en-US" sz="1200" dirty="0">
-                <a:latin typeface="Courier New" panose="02070309020205020404" pitchFamily="49" charset="0"/>
-                <a:cs typeface="Courier New" panose="02070309020205020404" pitchFamily="49" charset="0"/>
-              </a:rPr>
-              <a:t>/main.rs:5:17</a:t>
-            </a:r>
-          </a:p>
-          <a:p>
-            <a:r>
-              <a:rPr lang="en-US" sz="1200" dirty="0">
-                <a:latin typeface="Courier New" panose="02070309020205020404" pitchFamily="49" charset="0"/>
-                <a:cs typeface="Courier New" panose="02070309020205020404" pitchFamily="49" charset="0"/>
-              </a:rPr>
-              <a:t>  |</a:t>
-            </a:r>
-          </a:p>
-          <a:p>
-            <a:r>
-              <a:rPr lang="en-US" sz="1200" dirty="0">
-                <a:latin typeface="Courier New" panose="02070309020205020404" pitchFamily="49" charset="0"/>
-                <a:cs typeface="Courier New" panose="02070309020205020404" pitchFamily="49" charset="0"/>
-              </a:rPr>
-              <a:t>5 |         if item &gt; largest {</a:t>
-            </a:r>
-          </a:p>
-          <a:p>
-            <a:r>
-              <a:rPr lang="en-US" sz="1200" dirty="0">
-                <a:latin typeface="Courier New" panose="02070309020205020404" pitchFamily="49" charset="0"/>
-                <a:cs typeface="Courier New" panose="02070309020205020404" pitchFamily="49" charset="0"/>
-              </a:rPr>
-              <a:t>  |            ---- ^ ------- &amp;T</a:t>
-            </a:r>
-          </a:p>
-          <a:p>
-            <a:r>
-              <a:rPr lang="en-US" sz="1200" dirty="0">
-                <a:latin typeface="Courier New" panose="02070309020205020404" pitchFamily="49" charset="0"/>
-                <a:cs typeface="Courier New" panose="02070309020205020404" pitchFamily="49" charset="0"/>
-              </a:rPr>
-              <a:t>  |            |</a:t>
-            </a:r>
-          </a:p>
-          <a:p>
-            <a:r>
-              <a:rPr lang="en-US" sz="1200" dirty="0">
-                <a:latin typeface="Courier New" panose="02070309020205020404" pitchFamily="49" charset="0"/>
-                <a:cs typeface="Courier New" panose="02070309020205020404" pitchFamily="49" charset="0"/>
-              </a:rPr>
-              <a:t>  |            &amp;T</a:t>
-            </a:r>
-          </a:p>
-          <a:p>
-            <a:r>
-              <a:rPr lang="en-US" sz="1200" dirty="0">
-                <a:latin typeface="Courier New" panose="02070309020205020404" pitchFamily="49" charset="0"/>
-                <a:cs typeface="Courier New" panose="02070309020205020404" pitchFamily="49" charset="0"/>
-              </a:rPr>
-              <a:t>  |</a:t>
-            </a:r>
-          </a:p>
-          <a:p>
-            <a:r>
-              <a:rPr lang="en-US" sz="1200" dirty="0">
-                <a:latin typeface="Courier New" panose="02070309020205020404" pitchFamily="49" charset="0"/>
-                <a:cs typeface="Courier New" panose="02070309020205020404" pitchFamily="49" charset="0"/>
-              </a:rPr>
-              <a:t>help: consider restricting type parameter `T`</a:t>
-            </a:r>
-          </a:p>
-          <a:p>
-            <a:r>
-              <a:rPr lang="en-US" sz="1200" dirty="0">
-                <a:latin typeface="Courier New" panose="02070309020205020404" pitchFamily="49" charset="0"/>
-                <a:cs typeface="Courier New" panose="02070309020205020404" pitchFamily="49" charset="0"/>
-              </a:rPr>
-              <a:t>  |</a:t>
-            </a:r>
-          </a:p>
-          <a:p>
-            <a:r>
-              <a:rPr lang="en-US" sz="1200" dirty="0">
-                <a:latin typeface="Courier New" panose="02070309020205020404" pitchFamily="49" charset="0"/>
-                <a:cs typeface="Courier New" panose="02070309020205020404" pitchFamily="49" charset="0"/>
-              </a:rPr>
-              <a:t>1 | fn largest&lt;T: std::</a:t>
-            </a:r>
-            <a:r>
-              <a:rPr lang="en-US" sz="1200" dirty="0" err="1">
-                <a:latin typeface="Courier New" panose="02070309020205020404" pitchFamily="49" charset="0"/>
-                <a:cs typeface="Courier New" panose="02070309020205020404" pitchFamily="49" charset="0"/>
-              </a:rPr>
-              <a:t>cmp</a:t>
-            </a:r>
-            <a:r>
-              <a:rPr lang="en-US" sz="1200" dirty="0">
-                <a:latin typeface="Courier New" panose="02070309020205020404" pitchFamily="49" charset="0"/>
-                <a:cs typeface="Courier New" panose="02070309020205020404" pitchFamily="49" charset="0"/>
-              </a:rPr>
-              <a:t>::</a:t>
-            </a:r>
-            <a:r>
-              <a:rPr lang="en-US" sz="1200" dirty="0" err="1">
-                <a:latin typeface="Courier New" panose="02070309020205020404" pitchFamily="49" charset="0"/>
-                <a:cs typeface="Courier New" panose="02070309020205020404" pitchFamily="49" charset="0"/>
-              </a:rPr>
-              <a:t>PartialOrd</a:t>
-            </a:r>
-            <a:r>
-              <a:rPr lang="en-US" sz="1200" dirty="0">
-                <a:latin typeface="Courier New" panose="02070309020205020404" pitchFamily="49" charset="0"/>
-                <a:cs typeface="Courier New" panose="02070309020205020404" pitchFamily="49" charset="0"/>
-              </a:rPr>
-              <a:t>&gt;(list: &amp;[T]) -&gt; &amp;T {</a:t>
-            </a:r>
-          </a:p>
-          <a:p>
-            <a:r>
-              <a:rPr lang="en-US" sz="1200" dirty="0">
-                <a:latin typeface="Courier New" panose="02070309020205020404" pitchFamily="49" charset="0"/>
-                <a:cs typeface="Courier New" panose="02070309020205020404" pitchFamily="49" charset="0"/>
-              </a:rPr>
-              <a:t>  |             ++++++++++++++++++++++</a:t>
-            </a:r>
-          </a:p>
-          <a:p>
-            <a:endParaRPr lang="en-US" sz="1600" u="sng" dirty="0">
-              <a:latin typeface="Courier New" panose="02070309020205020404" pitchFamily="49" charset="0"/>
-              <a:cs typeface="Courier New" panose="02070309020205020404" pitchFamily="49" charset="0"/>
-            </a:endParaRPr>
-          </a:p>
-        </p:txBody>
-      </p:sp>
-      <p:sp>
-        <p:nvSpPr>
-          <p:cNvPr id="26" name="TextBox 25">
-            <a:extLst>
-              <a:ext uri="{FF2B5EF4-FFF2-40B4-BE49-F238E27FC236}">
-                <a16:creationId xmlns:a16="http://schemas.microsoft.com/office/drawing/2014/main" id="{B81D65CA-86B1-70EE-F5CD-04E4B5BB2E7E}"/>
-              </a:ext>
-            </a:extLst>
-          </p:cNvPr>
-          <p:cNvSpPr txBox="1"/>
-          <p:nvPr/>
-        </p:nvSpPr>
-        <p:spPr>
-          <a:xfrm>
-            <a:off x="7294430" y="5193483"/>
-            <a:ext cx="4666357" cy="1754326"/>
-          </a:xfrm>
-          <a:prstGeom prst="rect">
-            <a:avLst/>
-          </a:prstGeom>
-          <a:noFill/>
-        </p:spPr>
-        <p:txBody>
-          <a:bodyPr wrap="square" rtlCol="0">
-            <a:spAutoFit/>
-          </a:bodyPr>
-          <a:lstStyle/>
-          <a:p>
-            <a:r>
-              <a:rPr lang="ru-RU" u="sng" dirty="0">
-                <a:solidFill>
-                  <a:srgbClr val="FF0000"/>
-                </a:solidFill>
-              </a:rPr>
-              <a:t>Ошибка: </a:t>
-            </a:r>
-          </a:p>
-          <a:p>
-            <a:r>
-              <a:rPr kumimoji="0" lang="ru-RU" altLang="ru-RU" sz="1800" b="0" i="0" u="none" strike="noStrike" cap="none" normalizeH="0" baseline="0" dirty="0">
-                <a:ln>
-                  <a:noFill/>
-                </a:ln>
-                <a:solidFill>
-                  <a:schemeClr val="tx1"/>
-                </a:solidFill>
-                <a:effectLst/>
-                <a:latin typeface="Arial" panose="020B0604020202020204" pitchFamily="34" charset="0"/>
-              </a:rPr>
-              <a:t>функция не будет работать для всех </a:t>
-            </a:r>
-          </a:p>
-          <a:p>
-            <a:r>
-              <a:rPr kumimoji="0" lang="ru-RU" altLang="ru-RU" sz="1800" b="0" i="0" u="none" strike="noStrike" cap="none" normalizeH="0" baseline="0" dirty="0">
-                <a:ln>
-                  <a:noFill/>
-                </a:ln>
-                <a:solidFill>
-                  <a:schemeClr val="tx1"/>
-                </a:solidFill>
-                <a:effectLst/>
-                <a:latin typeface="Arial" panose="020B0604020202020204" pitchFamily="34" charset="0"/>
-              </a:rPr>
-              <a:t>возможных типо</a:t>
-            </a:r>
-            <a:r>
-              <a:rPr lang="ru-RU" altLang="ru-RU" dirty="0">
-                <a:latin typeface="Arial" panose="020B0604020202020204" pitchFamily="34" charset="0"/>
-              </a:rPr>
-              <a:t>в </a:t>
-            </a:r>
-            <a:r>
-              <a:rPr lang="en-US" altLang="ru-RU" dirty="0">
-                <a:solidFill>
-                  <a:schemeClr val="accent1"/>
-                </a:solidFill>
-                <a:latin typeface="Arial" panose="020B0604020202020204" pitchFamily="34" charset="0"/>
-              </a:rPr>
-              <a:t>T</a:t>
-            </a:r>
-          </a:p>
-          <a:p>
-            <a:r>
-              <a:rPr kumimoji="0" lang="ru-RU" altLang="ru-RU" sz="1800" b="0" i="0" u="none" strike="noStrike" cap="none" normalizeH="0" baseline="0" dirty="0">
-                <a:ln>
-                  <a:noFill/>
-                </a:ln>
-                <a:effectLst/>
-                <a:latin typeface="Arial" panose="020B0604020202020204" pitchFamily="34" charset="0"/>
-              </a:rPr>
-              <a:t>Типы, которые</a:t>
-            </a:r>
-            <a:r>
-              <a:rPr lang="ru-RU" altLang="ru-RU" dirty="0">
-                <a:latin typeface="Arial" panose="020B0604020202020204" pitchFamily="34" charset="0"/>
-              </a:rPr>
-              <a:t> можно </a:t>
-            </a:r>
-            <a:r>
-              <a:rPr lang="ru-RU" altLang="ru-RU" dirty="0">
-                <a:solidFill>
-                  <a:schemeClr val="accent1"/>
-                </a:solidFill>
-                <a:latin typeface="Arial" panose="020B0604020202020204" pitchFamily="34" charset="0"/>
-              </a:rPr>
-              <a:t>упорядочивать</a:t>
-            </a:r>
-          </a:p>
-          <a:p>
-            <a:r>
-              <a:rPr kumimoji="0" lang="ru-RU" altLang="ru-RU" sz="1800" b="0" i="0" u="none" strike="noStrike" cap="none" normalizeH="0" baseline="0" dirty="0">
-                <a:ln>
-                  <a:noFill/>
-                </a:ln>
-                <a:effectLst/>
-                <a:latin typeface="Arial" panose="020B0604020202020204" pitchFamily="34" charset="0"/>
-              </a:rPr>
-              <a:t>Для сравнений: </a:t>
-            </a:r>
-            <a:r>
-              <a:rPr lang="it-IT" b="0" i="1" dirty="0">
-                <a:solidFill>
-                  <a:schemeClr val="accent1"/>
-                </a:solidFill>
-                <a:effectLst/>
-                <a:latin typeface="Consolas" panose="020B0609020204030204" pitchFamily="49" charset="0"/>
-              </a:rPr>
-              <a:t>std::cmp::PartialOrd</a:t>
-            </a:r>
-            <a:endParaRPr kumimoji="0" lang="ru-RU" altLang="ru-RU" sz="1800" b="0" i="0" u="none" strike="noStrike" cap="none" normalizeH="0" baseline="0" dirty="0">
-              <a:ln>
-                <a:noFill/>
-              </a:ln>
-              <a:solidFill>
-                <a:schemeClr val="accent1"/>
-              </a:solidFill>
-              <a:effectLst/>
-              <a:latin typeface="Arial" panose="020B0604020202020204" pitchFamily="34" charset="0"/>
-            </a:endParaRPr>
-          </a:p>
-          <a:p>
-            <a:endParaRPr lang="ru-RU" dirty="0"/>
-          </a:p>
-        </p:txBody>
-      </p:sp>
     </p:spTree>
     <p:extLst>
       <p:ext uri="{BB962C8B-B14F-4D97-AF65-F5344CB8AC3E}">
@@ -6029,7 +7149,7 @@
         </p:nvSpPr>
         <p:spPr>
           <a:xfrm>
-            <a:off x="7451492" y="1439611"/>
+            <a:off x="7451492" y="1448942"/>
             <a:ext cx="4499877" cy="3416320"/>
           </a:xfrm>
           <a:prstGeom prst="rect">

</xml_diff>